<commit_message>
Model Script predicts utilization with all vars
</commit_message>
<xml_diff>
--- a/Capstone/Reports/Springboard Capstone Presentation.pptx
+++ b/Capstone/Reports/Springboard Capstone Presentation.pptx
@@ -5,7 +5,7 @@
     <p:sldMasterId id="2147483756" r:id="rId1"/>
   </p:sldMasterIdLst>
   <p:notesMasterIdLst>
-    <p:notesMasterId r:id="rId17"/>
+    <p:notesMasterId r:id="rId18"/>
   </p:notesMasterIdLst>
   <p:sldIdLst>
     <p:sldId id="256" r:id="rId2"/>
@@ -18,11 +18,12 @@
     <p:sldId id="264" r:id="rId9"/>
     <p:sldId id="263" r:id="rId10"/>
     <p:sldId id="266" r:id="rId11"/>
-    <p:sldId id="265" r:id="rId12"/>
-    <p:sldId id="267" r:id="rId13"/>
-    <p:sldId id="268" r:id="rId14"/>
-    <p:sldId id="269" r:id="rId15"/>
-    <p:sldId id="270" r:id="rId16"/>
+    <p:sldId id="271" r:id="rId12"/>
+    <p:sldId id="265" r:id="rId13"/>
+    <p:sldId id="267" r:id="rId14"/>
+    <p:sldId id="268" r:id="rId15"/>
+    <p:sldId id="269" r:id="rId16"/>
+    <p:sldId id="270" r:id="rId17"/>
   </p:sldIdLst>
   <p:sldSz cx="12192000" cy="6858000"/>
   <p:notesSz cx="6858000" cy="9144000"/>
@@ -211,7 +212,7 @@
           <a:p>
             <a:fld id="{22478332-10B4-4D90-919D-817633DB350D}" type="datetimeFigureOut">
               <a:rPr lang="en-US" smtClean="0"/>
-              <a:t>12/19/2018</a:t>
+              <a:t>12/28/2018</a:t>
             </a:fld>
             <a:endParaRPr lang="en-US"/>
           </a:p>
@@ -713,7 +714,7 @@
           <a:p>
             <a:fld id="{00679280-235A-4B5D-993A-2D55C887A56A}" type="datetimeFigureOut">
               <a:rPr lang="en-US" smtClean="0"/>
-              <a:t>12/19/2018</a:t>
+              <a:t>12/28/2018</a:t>
             </a:fld>
             <a:endParaRPr lang="en-US"/>
           </a:p>
@@ -924,7 +925,7 @@
           <a:p>
             <a:fld id="{00679280-235A-4B5D-993A-2D55C887A56A}" type="datetimeFigureOut">
               <a:rPr lang="en-US" smtClean="0"/>
-              <a:t>12/19/2018</a:t>
+              <a:t>12/28/2018</a:t>
             </a:fld>
             <a:endParaRPr lang="en-US"/>
           </a:p>
@@ -1139,7 +1140,7 @@
           <a:p>
             <a:fld id="{00679280-235A-4B5D-993A-2D55C887A56A}" type="datetimeFigureOut">
               <a:rPr lang="en-US" smtClean="0"/>
-              <a:t>12/19/2018</a:t>
+              <a:t>12/28/2018</a:t>
             </a:fld>
             <a:endParaRPr lang="en-US"/>
           </a:p>
@@ -1340,7 +1341,7 @@
           <a:p>
             <a:fld id="{00679280-235A-4B5D-993A-2D55C887A56A}" type="datetimeFigureOut">
               <a:rPr lang="en-US" smtClean="0"/>
-              <a:t>12/19/2018</a:t>
+              <a:t>12/28/2018</a:t>
             </a:fld>
             <a:endParaRPr lang="en-US"/>
           </a:p>
@@ -1619,7 +1620,7 @@
           <a:p>
             <a:fld id="{00679280-235A-4B5D-993A-2D55C887A56A}" type="datetimeFigureOut">
               <a:rPr lang="en-US" smtClean="0"/>
-              <a:t>12/19/2018</a:t>
+              <a:t>12/28/2018</a:t>
             </a:fld>
             <a:endParaRPr lang="en-US"/>
           </a:p>
@@ -1887,7 +1888,7 @@
           <a:p>
             <a:fld id="{00679280-235A-4B5D-993A-2D55C887A56A}" type="datetimeFigureOut">
               <a:rPr lang="en-US" smtClean="0"/>
-              <a:t>12/19/2018</a:t>
+              <a:t>12/28/2018</a:t>
             </a:fld>
             <a:endParaRPr lang="en-US"/>
           </a:p>
@@ -2303,7 +2304,7 @@
           <a:p>
             <a:fld id="{00679280-235A-4B5D-993A-2D55C887A56A}" type="datetimeFigureOut">
               <a:rPr lang="en-US" smtClean="0"/>
-              <a:t>12/19/2018</a:t>
+              <a:t>12/28/2018</a:t>
             </a:fld>
             <a:endParaRPr lang="en-US"/>
           </a:p>
@@ -2452,7 +2453,7 @@
           <a:p>
             <a:fld id="{00679280-235A-4B5D-993A-2D55C887A56A}" type="datetimeFigureOut">
               <a:rPr lang="en-US" smtClean="0"/>
-              <a:t>12/19/2018</a:t>
+              <a:t>12/28/2018</a:t>
             </a:fld>
             <a:endParaRPr lang="en-US"/>
           </a:p>
@@ -2578,7 +2579,7 @@
           <a:p>
             <a:fld id="{00679280-235A-4B5D-993A-2D55C887A56A}" type="datetimeFigureOut">
               <a:rPr lang="en-US" smtClean="0"/>
-              <a:t>12/19/2018</a:t>
+              <a:t>12/28/2018</a:t>
             </a:fld>
             <a:endParaRPr lang="en-US"/>
           </a:p>
@@ -2829,7 +2830,7 @@
           <a:p>
             <a:fld id="{00679280-235A-4B5D-993A-2D55C887A56A}" type="datetimeFigureOut">
               <a:rPr lang="en-US" smtClean="0"/>
-              <a:t>12/19/2018</a:t>
+              <a:t>12/28/2018</a:t>
             </a:fld>
             <a:endParaRPr lang="en-US"/>
           </a:p>
@@ -3274,7 +3275,7 @@
           <a:p>
             <a:fld id="{00679280-235A-4B5D-993A-2D55C887A56A}" type="datetimeFigureOut">
               <a:rPr lang="en-US" smtClean="0"/>
-              <a:t>12/19/2018</a:t>
+              <a:t>12/28/2018</a:t>
             </a:fld>
             <a:endParaRPr lang="en-US"/>
           </a:p>
@@ -3600,7 +3601,7 @@
           <a:p>
             <a:fld id="{00679280-235A-4B5D-993A-2D55C887A56A}" type="datetimeFigureOut">
               <a:rPr lang="en-US" smtClean="0"/>
-              <a:t>12/19/2018</a:t>
+              <a:t>12/28/2018</a:t>
             </a:fld>
             <a:endParaRPr lang="en-US"/>
           </a:p>
@@ -4666,6 +4667,79 @@
 </file>
 
 <file path=ppt/slides/slide11.xml><?xml version="1.0" encoding="utf-8"?>
+<p:sld xmlns:a="http://schemas.openxmlformats.org/drawingml/2006/main" xmlns:r="http://schemas.openxmlformats.org/officeDocument/2006/relationships" xmlns:p="http://schemas.openxmlformats.org/presentationml/2006/main" showMasterSp="0">
+  <p:cSld>
+    <p:bg>
+      <p:bgPr>
+        <a:solidFill>
+          <a:schemeClr val="bg1"/>
+        </a:solidFill>
+        <a:effectLst/>
+      </p:bgPr>
+    </p:bg>
+    <p:spTree>
+      <p:nvGrpSpPr>
+        <p:cNvPr id="1" name=""/>
+        <p:cNvGrpSpPr/>
+        <p:nvPr/>
+      </p:nvGrpSpPr>
+      <p:grpSpPr>
+        <a:xfrm>
+          <a:off x="0" y="0"/>
+          <a:ext cx="0" cy="0"/>
+          <a:chOff x="0" y="0"/>
+          <a:chExt cx="0" cy="0"/>
+        </a:xfrm>
+      </p:grpSpPr>
+      <p:sp>
+        <p:nvSpPr>
+          <p:cNvPr id="2" name="Title 1">
+            <a:extLst>
+              <a:ext uri="{FF2B5EF4-FFF2-40B4-BE49-F238E27FC236}">
+                <a16:creationId xmlns:a16="http://schemas.microsoft.com/office/drawing/2014/main" id="{38D793B7-D998-4EA2-97D9-94D0288A9A0F}"/>
+              </a:ext>
+            </a:extLst>
+          </p:cNvPr>
+          <p:cNvSpPr>
+            <a:spLocks noGrp="1"/>
+          </p:cNvSpPr>
+          <p:nvPr>
+            <p:ph type="title"/>
+          </p:nvPr>
+        </p:nvSpPr>
+        <p:spPr>
+          <a:xfrm>
+            <a:off x="339980" y="386254"/>
+            <a:ext cx="11562986" cy="938049"/>
+          </a:xfrm>
+        </p:spPr>
+        <p:txBody>
+          <a:bodyPr anchor="ctr">
+            <a:normAutofit/>
+          </a:bodyPr>
+          <a:lstStyle/>
+          <a:p>
+            <a:r>
+              <a:rPr lang="en-US" dirty="0"/>
+              <a:t>Important Findings</a:t>
+            </a:r>
+          </a:p>
+        </p:txBody>
+      </p:sp>
+    </p:spTree>
+    <p:extLst>
+      <p:ext uri="{BB962C8B-B14F-4D97-AF65-F5344CB8AC3E}">
+        <p14:creationId xmlns:p14="http://schemas.microsoft.com/office/powerpoint/2010/main" val="1352183905"/>
+      </p:ext>
+    </p:extLst>
+  </p:cSld>
+  <p:clrMapOvr>
+    <a:masterClrMapping/>
+  </p:clrMapOvr>
+</p:sld>
+</file>
+
+<file path=ppt/slides/slide12.xml><?xml version="1.0" encoding="utf-8"?>
 <p:sld xmlns:a="http://schemas.openxmlformats.org/drawingml/2006/main" xmlns:r="http://schemas.openxmlformats.org/officeDocument/2006/relationships" xmlns:p="http://schemas.openxmlformats.org/presentationml/2006/main">
   <p:cSld>
     <p:bg>
@@ -4918,43 +4992,6 @@
           </a:fontRef>
         </p:style>
       </p:cxnSp>
-      <p:pic>
-        <p:nvPicPr>
-          <p:cNvPr id="5" name="Content Placeholder 4" descr="A picture containing picture frame&#10;&#10;Description automatically generated">
-            <a:extLst>
-              <a:ext uri="{FF2B5EF4-FFF2-40B4-BE49-F238E27FC236}">
-                <a16:creationId xmlns:a16="http://schemas.microsoft.com/office/drawing/2014/main" id="{9F7572C0-83BA-49BE-8386-E63B239A6617}"/>
-              </a:ext>
-            </a:extLst>
-          </p:cNvPr>
-          <p:cNvPicPr>
-            <a:picLocks noGrp="1" noChangeAspect="1"/>
-          </p:cNvPicPr>
-          <p:nvPr>
-            <p:ph idx="1"/>
-          </p:nvPr>
-        </p:nvPicPr>
-        <p:blipFill rotWithShape="1">
-          <a:blip r:embed="rId3">
-            <a:extLst>
-              <a:ext uri="{28A0092B-C50C-407E-A947-70E740481C1C}">
-                <a14:useLocalDpi xmlns:a14="http://schemas.microsoft.com/office/drawing/2010/main" val="0"/>
-              </a:ext>
-            </a:extLst>
-          </a:blip>
-          <a:srcRect r="-1" b="15728"/>
-          <a:stretch/>
-        </p:blipFill>
-        <p:spPr>
-          <a:xfrm>
-            <a:off x="20" y="10"/>
-            <a:ext cx="12191675" cy="6857990"/>
-          </a:xfrm>
-          <a:prstGeom prst="rect">
-            <a:avLst/>
-          </a:prstGeom>
-        </p:spPr>
-      </p:pic>
       <p:sp>
         <p:nvSpPr>
           <p:cNvPr id="18" name="Rectangle 17">
@@ -5109,83 +5146,35 @@
           </a:fontRef>
         </p:style>
       </p:cxnSp>
+      <p:sp>
+        <p:nvSpPr>
+          <p:cNvPr id="4" name="Content Placeholder 3">
+            <a:extLst>
+              <a:ext uri="{FF2B5EF4-FFF2-40B4-BE49-F238E27FC236}">
+                <a16:creationId xmlns:a16="http://schemas.microsoft.com/office/drawing/2014/main" id="{A5DC43D7-3AAD-4B8C-8A65-C8B2C6DF07C3}"/>
+              </a:ext>
+            </a:extLst>
+          </p:cNvPr>
+          <p:cNvSpPr>
+            <a:spLocks noGrp="1"/>
+          </p:cNvSpPr>
+          <p:nvPr>
+            <p:ph idx="1"/>
+          </p:nvPr>
+        </p:nvSpPr>
+        <p:spPr/>
+        <p:txBody>
+          <a:bodyPr/>
+          <a:lstStyle/>
+          <a:p>
+            <a:endParaRPr lang="en-US"/>
+          </a:p>
+        </p:txBody>
+      </p:sp>
     </p:spTree>
     <p:extLst>
       <p:ext uri="{BB962C8B-B14F-4D97-AF65-F5344CB8AC3E}">
         <p14:creationId xmlns:p14="http://schemas.microsoft.com/office/powerpoint/2010/main" val="2528402107"/>
-      </p:ext>
-    </p:extLst>
-  </p:cSld>
-  <p:clrMapOvr>
-    <a:masterClrMapping/>
-  </p:clrMapOvr>
-</p:sld>
-</file>
-
-<file path=ppt/slides/slide12.xml><?xml version="1.0" encoding="utf-8"?>
-<p:sld xmlns:a="http://schemas.openxmlformats.org/drawingml/2006/main" xmlns:r="http://schemas.openxmlformats.org/officeDocument/2006/relationships" xmlns:p="http://schemas.openxmlformats.org/presentationml/2006/main" showMasterSp="0">
-  <p:cSld>
-    <p:bg>
-      <p:bgPr>
-        <a:solidFill>
-          <a:schemeClr val="bg1"/>
-        </a:solidFill>
-        <a:effectLst/>
-      </p:bgPr>
-    </p:bg>
-    <p:spTree>
-      <p:nvGrpSpPr>
-        <p:cNvPr id="1" name=""/>
-        <p:cNvGrpSpPr/>
-        <p:nvPr/>
-      </p:nvGrpSpPr>
-      <p:grpSpPr>
-        <a:xfrm>
-          <a:off x="0" y="0"/>
-          <a:ext cx="0" cy="0"/>
-          <a:chOff x="0" y="0"/>
-          <a:chExt cx="0" cy="0"/>
-        </a:xfrm>
-      </p:grpSpPr>
-      <p:sp>
-        <p:nvSpPr>
-          <p:cNvPr id="2" name="Title 1">
-            <a:extLst>
-              <a:ext uri="{FF2B5EF4-FFF2-40B4-BE49-F238E27FC236}">
-                <a16:creationId xmlns:a16="http://schemas.microsoft.com/office/drawing/2014/main" id="{38D793B7-D998-4EA2-97D9-94D0288A9A0F}"/>
-              </a:ext>
-            </a:extLst>
-          </p:cNvPr>
-          <p:cNvSpPr>
-            <a:spLocks noGrp="1"/>
-          </p:cNvSpPr>
-          <p:nvPr>
-            <p:ph type="title"/>
-          </p:nvPr>
-        </p:nvSpPr>
-        <p:spPr>
-          <a:xfrm>
-            <a:off x="339980" y="386254"/>
-            <a:ext cx="11562986" cy="938049"/>
-          </a:xfrm>
-        </p:spPr>
-        <p:txBody>
-          <a:bodyPr anchor="ctr">
-            <a:normAutofit/>
-          </a:bodyPr>
-          <a:lstStyle/>
-          <a:p>
-            <a:r>
-              <a:rPr lang="en-US" dirty="0"/>
-              <a:t>Model Chosen &amp; Why</a:t>
-            </a:r>
-          </a:p>
-        </p:txBody>
-      </p:sp>
-    </p:spTree>
-    <p:extLst>
-      <p:ext uri="{BB962C8B-B14F-4D97-AF65-F5344CB8AC3E}">
-        <p14:creationId xmlns:p14="http://schemas.microsoft.com/office/powerpoint/2010/main" val="3515818864"/>
       </p:ext>
     </p:extLst>
   </p:cSld>
@@ -5250,7 +5239,7 @@
           <a:p>
             <a:r>
               <a:rPr lang="en-US" dirty="0"/>
-              <a:t>Results</a:t>
+              <a:t>Model Chosen &amp; Why</a:t>
             </a:r>
           </a:p>
         </p:txBody>
@@ -5258,7 +5247,7 @@
     </p:spTree>
     <p:extLst>
       <p:ext uri="{BB962C8B-B14F-4D97-AF65-F5344CB8AC3E}">
-        <p14:creationId xmlns:p14="http://schemas.microsoft.com/office/powerpoint/2010/main" val="166002473"/>
+        <p14:creationId xmlns:p14="http://schemas.microsoft.com/office/powerpoint/2010/main" val="3515818864"/>
       </p:ext>
     </p:extLst>
   </p:cSld>
@@ -5323,6 +5312,79 @@
           <a:p>
             <a:r>
               <a:rPr lang="en-US" dirty="0"/>
+              <a:t>Results</a:t>
+            </a:r>
+          </a:p>
+        </p:txBody>
+      </p:sp>
+    </p:spTree>
+    <p:extLst>
+      <p:ext uri="{BB962C8B-B14F-4D97-AF65-F5344CB8AC3E}">
+        <p14:creationId xmlns:p14="http://schemas.microsoft.com/office/powerpoint/2010/main" val="166002473"/>
+      </p:ext>
+    </p:extLst>
+  </p:cSld>
+  <p:clrMapOvr>
+    <a:masterClrMapping/>
+  </p:clrMapOvr>
+</p:sld>
+</file>
+
+<file path=ppt/slides/slide15.xml><?xml version="1.0" encoding="utf-8"?>
+<p:sld xmlns:a="http://schemas.openxmlformats.org/drawingml/2006/main" xmlns:r="http://schemas.openxmlformats.org/officeDocument/2006/relationships" xmlns:p="http://schemas.openxmlformats.org/presentationml/2006/main" showMasterSp="0">
+  <p:cSld>
+    <p:bg>
+      <p:bgPr>
+        <a:solidFill>
+          <a:schemeClr val="bg1"/>
+        </a:solidFill>
+        <a:effectLst/>
+      </p:bgPr>
+    </p:bg>
+    <p:spTree>
+      <p:nvGrpSpPr>
+        <p:cNvPr id="1" name=""/>
+        <p:cNvGrpSpPr/>
+        <p:nvPr/>
+      </p:nvGrpSpPr>
+      <p:grpSpPr>
+        <a:xfrm>
+          <a:off x="0" y="0"/>
+          <a:ext cx="0" cy="0"/>
+          <a:chOff x="0" y="0"/>
+          <a:chExt cx="0" cy="0"/>
+        </a:xfrm>
+      </p:grpSpPr>
+      <p:sp>
+        <p:nvSpPr>
+          <p:cNvPr id="2" name="Title 1">
+            <a:extLst>
+              <a:ext uri="{FF2B5EF4-FFF2-40B4-BE49-F238E27FC236}">
+                <a16:creationId xmlns:a16="http://schemas.microsoft.com/office/drawing/2014/main" id="{38D793B7-D998-4EA2-97D9-94D0288A9A0F}"/>
+              </a:ext>
+            </a:extLst>
+          </p:cNvPr>
+          <p:cNvSpPr>
+            <a:spLocks noGrp="1"/>
+          </p:cNvSpPr>
+          <p:nvPr>
+            <p:ph type="title"/>
+          </p:nvPr>
+        </p:nvSpPr>
+        <p:spPr>
+          <a:xfrm>
+            <a:off x="339980" y="386254"/>
+            <a:ext cx="11562986" cy="938049"/>
+          </a:xfrm>
+        </p:spPr>
+        <p:txBody>
+          <a:bodyPr anchor="ctr">
+            <a:normAutofit/>
+          </a:bodyPr>
+          <a:lstStyle/>
+          <a:p>
+            <a:r>
+              <a:rPr lang="en-US" dirty="0"/>
               <a:t>Recommendations</a:t>
             </a:r>
           </a:p>
@@ -5341,7 +5403,7 @@
 </p:sld>
 </file>
 
-<file path=ppt/slides/slide15.xml><?xml version="1.0" encoding="utf-8"?>
+<file path=ppt/slides/slide16.xml><?xml version="1.0" encoding="utf-8"?>
 <p:sld xmlns:a="http://schemas.openxmlformats.org/drawingml/2006/main" xmlns:r="http://schemas.openxmlformats.org/officeDocument/2006/relationships" xmlns:p="http://schemas.openxmlformats.org/presentationml/2006/main" showMasterSp="0">
   <p:cSld>
     <p:bg>

</xml_diff>

<commit_message>
Renamed scripts for easier reading, finished modeling script pending review
</commit_message>
<xml_diff>
--- a/Capstone/Reports/Springboard Capstone Presentation.pptx
+++ b/Capstone/Reports/Springboard Capstone Presentation.pptx
@@ -212,7 +212,7 @@
           <a:p>
             <a:fld id="{22478332-10B4-4D90-919D-817633DB350D}" type="datetimeFigureOut">
               <a:rPr lang="en-US" smtClean="0"/>
-              <a:t>12/28/2018</a:t>
+              <a:t>1/1/2019</a:t>
             </a:fld>
             <a:endParaRPr lang="en-US"/>
           </a:p>
@@ -714,7 +714,7 @@
           <a:p>
             <a:fld id="{00679280-235A-4B5D-993A-2D55C887A56A}" type="datetimeFigureOut">
               <a:rPr lang="en-US" smtClean="0"/>
-              <a:t>12/28/2018</a:t>
+              <a:t>1/1/2019</a:t>
             </a:fld>
             <a:endParaRPr lang="en-US"/>
           </a:p>
@@ -925,7 +925,7 @@
           <a:p>
             <a:fld id="{00679280-235A-4B5D-993A-2D55C887A56A}" type="datetimeFigureOut">
               <a:rPr lang="en-US" smtClean="0"/>
-              <a:t>12/28/2018</a:t>
+              <a:t>1/1/2019</a:t>
             </a:fld>
             <a:endParaRPr lang="en-US"/>
           </a:p>
@@ -1140,7 +1140,7 @@
           <a:p>
             <a:fld id="{00679280-235A-4B5D-993A-2D55C887A56A}" type="datetimeFigureOut">
               <a:rPr lang="en-US" smtClean="0"/>
-              <a:t>12/28/2018</a:t>
+              <a:t>1/1/2019</a:t>
             </a:fld>
             <a:endParaRPr lang="en-US"/>
           </a:p>
@@ -1341,7 +1341,7 @@
           <a:p>
             <a:fld id="{00679280-235A-4B5D-993A-2D55C887A56A}" type="datetimeFigureOut">
               <a:rPr lang="en-US" smtClean="0"/>
-              <a:t>12/28/2018</a:t>
+              <a:t>1/1/2019</a:t>
             </a:fld>
             <a:endParaRPr lang="en-US"/>
           </a:p>
@@ -1620,7 +1620,7 @@
           <a:p>
             <a:fld id="{00679280-235A-4B5D-993A-2D55C887A56A}" type="datetimeFigureOut">
               <a:rPr lang="en-US" smtClean="0"/>
-              <a:t>12/28/2018</a:t>
+              <a:t>1/1/2019</a:t>
             </a:fld>
             <a:endParaRPr lang="en-US"/>
           </a:p>
@@ -1888,7 +1888,7 @@
           <a:p>
             <a:fld id="{00679280-235A-4B5D-993A-2D55C887A56A}" type="datetimeFigureOut">
               <a:rPr lang="en-US" smtClean="0"/>
-              <a:t>12/28/2018</a:t>
+              <a:t>1/1/2019</a:t>
             </a:fld>
             <a:endParaRPr lang="en-US"/>
           </a:p>
@@ -2304,7 +2304,7 @@
           <a:p>
             <a:fld id="{00679280-235A-4B5D-993A-2D55C887A56A}" type="datetimeFigureOut">
               <a:rPr lang="en-US" smtClean="0"/>
-              <a:t>12/28/2018</a:t>
+              <a:t>1/1/2019</a:t>
             </a:fld>
             <a:endParaRPr lang="en-US"/>
           </a:p>
@@ -2453,7 +2453,7 @@
           <a:p>
             <a:fld id="{00679280-235A-4B5D-993A-2D55C887A56A}" type="datetimeFigureOut">
               <a:rPr lang="en-US" smtClean="0"/>
-              <a:t>12/28/2018</a:t>
+              <a:t>1/1/2019</a:t>
             </a:fld>
             <a:endParaRPr lang="en-US"/>
           </a:p>
@@ -2579,7 +2579,7 @@
           <a:p>
             <a:fld id="{00679280-235A-4B5D-993A-2D55C887A56A}" type="datetimeFigureOut">
               <a:rPr lang="en-US" smtClean="0"/>
-              <a:t>12/28/2018</a:t>
+              <a:t>1/1/2019</a:t>
             </a:fld>
             <a:endParaRPr lang="en-US"/>
           </a:p>
@@ -2830,7 +2830,7 @@
           <a:p>
             <a:fld id="{00679280-235A-4B5D-993A-2D55C887A56A}" type="datetimeFigureOut">
               <a:rPr lang="en-US" smtClean="0"/>
-              <a:t>12/28/2018</a:t>
+              <a:t>1/1/2019</a:t>
             </a:fld>
             <a:endParaRPr lang="en-US"/>
           </a:p>
@@ -3275,7 +3275,7 @@
           <a:p>
             <a:fld id="{00679280-235A-4B5D-993A-2D55C887A56A}" type="datetimeFigureOut">
               <a:rPr lang="en-US" smtClean="0"/>
-              <a:t>12/28/2018</a:t>
+              <a:t>1/1/2019</a:t>
             </a:fld>
             <a:endParaRPr lang="en-US"/>
           </a:p>
@@ -3601,7 +3601,7 @@
           <a:p>
             <a:fld id="{00679280-235A-4B5D-993A-2D55C887A56A}" type="datetimeFigureOut">
               <a:rPr lang="en-US" smtClean="0"/>
-              <a:t>12/28/2018</a:t>
+              <a:t>1/1/2019</a:t>
             </a:fld>
             <a:endParaRPr lang="en-US"/>
           </a:p>

</xml_diff>